<commit_message>
Adding small image files
</commit_message>
<xml_diff>
--- a/plots/Fig1.pptx
+++ b/plots/Fig1.pptx
@@ -210,7 +210,7 @@
           <a:p>
             <a:fld id="{9720556A-E891-C241-ADFA-FA23D486858E}" type="datetimeFigureOut">
               <a:rPr lang="en-US" smtClean="0"/>
-              <a:t>9/27/21</a:t>
+              <a:t>10/29/21</a:t>
             </a:fld>
             <a:endParaRPr lang="en-US"/>
           </a:p>
@@ -991,7 +991,7 @@
           <a:p>
             <a:fld id="{4E4E7A57-1325-B14F-A447-20A016752477}" type="datetimeFigureOut">
               <a:rPr lang="en-US" smtClean="0"/>
-              <a:t>9/27/21</a:t>
+              <a:t>10/29/21</a:t>
             </a:fld>
             <a:endParaRPr lang="en-US"/>
           </a:p>
@@ -1189,7 +1189,7 @@
           <a:p>
             <a:fld id="{4E4E7A57-1325-B14F-A447-20A016752477}" type="datetimeFigureOut">
               <a:rPr lang="en-US" smtClean="0"/>
-              <a:t>9/27/21</a:t>
+              <a:t>10/29/21</a:t>
             </a:fld>
             <a:endParaRPr lang="en-US"/>
           </a:p>
@@ -1397,7 +1397,7 @@
           <a:p>
             <a:fld id="{4E4E7A57-1325-B14F-A447-20A016752477}" type="datetimeFigureOut">
               <a:rPr lang="en-US" smtClean="0"/>
-              <a:t>9/27/21</a:t>
+              <a:t>10/29/21</a:t>
             </a:fld>
             <a:endParaRPr lang="en-US"/>
           </a:p>
@@ -1662,7 +1662,7 @@
           <a:p>
             <a:fld id="{4E4E7A57-1325-B14F-A447-20A016752477}" type="datetimeFigureOut">
               <a:rPr lang="en-US" smtClean="0"/>
-              <a:t>9/27/21</a:t>
+              <a:t>10/29/21</a:t>
             </a:fld>
             <a:endParaRPr lang="en-US"/>
           </a:p>
@@ -1860,7 +1860,7 @@
           <a:p>
             <a:fld id="{4E4E7A57-1325-B14F-A447-20A016752477}" type="datetimeFigureOut">
               <a:rPr lang="en-US" smtClean="0"/>
-              <a:t>9/27/21</a:t>
+              <a:t>10/29/21</a:t>
             </a:fld>
             <a:endParaRPr lang="en-US"/>
           </a:p>
@@ -2135,7 +2135,7 @@
           <a:p>
             <a:fld id="{4E4E7A57-1325-B14F-A447-20A016752477}" type="datetimeFigureOut">
               <a:rPr lang="en-US" smtClean="0"/>
-              <a:t>9/27/21</a:t>
+              <a:t>10/29/21</a:t>
             </a:fld>
             <a:endParaRPr lang="en-US"/>
           </a:p>
@@ -2400,7 +2400,7 @@
           <a:p>
             <a:fld id="{4E4E7A57-1325-B14F-A447-20A016752477}" type="datetimeFigureOut">
               <a:rPr lang="en-US" smtClean="0"/>
-              <a:t>9/27/21</a:t>
+              <a:t>10/29/21</a:t>
             </a:fld>
             <a:endParaRPr lang="en-US"/>
           </a:p>
@@ -2812,7 +2812,7 @@
           <a:p>
             <a:fld id="{4E4E7A57-1325-B14F-A447-20A016752477}" type="datetimeFigureOut">
               <a:rPr lang="en-US" smtClean="0"/>
-              <a:t>9/27/21</a:t>
+              <a:t>10/29/21</a:t>
             </a:fld>
             <a:endParaRPr lang="en-US"/>
           </a:p>
@@ -2953,7 +2953,7 @@
           <a:p>
             <a:fld id="{4E4E7A57-1325-B14F-A447-20A016752477}" type="datetimeFigureOut">
               <a:rPr lang="en-US" smtClean="0"/>
-              <a:t>9/27/21</a:t>
+              <a:t>10/29/21</a:t>
             </a:fld>
             <a:endParaRPr lang="en-US"/>
           </a:p>
@@ -3066,7 +3066,7 @@
           <a:p>
             <a:fld id="{4E4E7A57-1325-B14F-A447-20A016752477}" type="datetimeFigureOut">
               <a:rPr lang="en-US" smtClean="0"/>
-              <a:t>9/27/21</a:t>
+              <a:t>10/29/21</a:t>
             </a:fld>
             <a:endParaRPr lang="en-US"/>
           </a:p>
@@ -3377,7 +3377,7 @@
           <a:p>
             <a:fld id="{4E4E7A57-1325-B14F-A447-20A016752477}" type="datetimeFigureOut">
               <a:rPr lang="en-US" smtClean="0"/>
-              <a:t>9/27/21</a:t>
+              <a:t>10/29/21</a:t>
             </a:fld>
             <a:endParaRPr lang="en-US"/>
           </a:p>
@@ -3668,7 +3668,7 @@
           <a:p>
             <a:fld id="{4E4E7A57-1325-B14F-A447-20A016752477}" type="datetimeFigureOut">
               <a:rPr lang="en-US" smtClean="0"/>
-              <a:t>9/27/21</a:t>
+              <a:t>10/29/21</a:t>
             </a:fld>
             <a:endParaRPr lang="en-US"/>
           </a:p>
@@ -3911,7 +3911,7 @@
           <a:p>
             <a:fld id="{4E4E7A57-1325-B14F-A447-20A016752477}" type="datetimeFigureOut">
               <a:rPr lang="en-US" smtClean="0"/>
-              <a:t>9/27/21</a:t>
+              <a:t>10/29/21</a:t>
             </a:fld>
             <a:endParaRPr lang="en-US"/>
           </a:p>
@@ -5072,12 +5072,6 @@
                     <a:t>y</a:t>
                   </a:r>
                   <a:r>
-                    <a:rPr lang="en-US" sz="2200" baseline="30000" dirty="0">
-                      <a:latin typeface="Century Gothic" panose="020B0502020202020204" pitchFamily="34" charset="0"/>
-                    </a:rPr>
-                    <a:t>S</a:t>
-                  </a:r>
-                  <a:r>
                     <a:rPr lang="en-US" sz="2200" baseline="-25000" dirty="0">
                       <a:latin typeface="Century Gothic" panose="020B0502020202020204" pitchFamily="34" charset="0"/>
                     </a:rPr>
@@ -5123,12 +5117,6 @@
                       <a:latin typeface="Century Gothic" panose="020B0502020202020204" pitchFamily="34" charset="0"/>
                     </a:rPr>
                     <a:t>y</a:t>
-                  </a:r>
-                  <a:r>
-                    <a:rPr lang="en-US" sz="2200" baseline="30000" dirty="0">
-                      <a:latin typeface="Century Gothic" panose="020B0502020202020204" pitchFamily="34" charset="0"/>
-                    </a:rPr>
-                    <a:t>S</a:t>
                   </a:r>
                   <a:r>
                     <a:rPr lang="en-US" sz="2200" baseline="-25000" dirty="0">
@@ -5218,16 +5206,10 @@
                   </a:lnSpc>
                 </a:pPr>
                 <a:r>
-                  <a:rPr lang="en-US" sz="2200" b="1" dirty="0" err="1">
+                  <a:rPr lang="en-US" sz="2200" b="1" dirty="0">
                     <a:latin typeface="Century Gothic" panose="020B0502020202020204" pitchFamily="34" charset="0"/>
                   </a:rPr>
                   <a:t>y</a:t>
-                </a:r>
-                <a:r>
-                  <a:rPr lang="en-US" sz="2200" baseline="30000" dirty="0" err="1">
-                    <a:latin typeface="Century Gothic" panose="020B0502020202020204" pitchFamily="34" charset="0"/>
-                  </a:rPr>
-                  <a:t>S</a:t>
                 </a:r>
                 <a:r>
                   <a:rPr lang="en-US" sz="2200" dirty="0">
@@ -5240,12 +5222,6 @@
                     <a:latin typeface="Century Gothic" panose="020B0502020202020204" pitchFamily="34" charset="0"/>
                   </a:rPr>
                   <a:t>y</a:t>
-                </a:r>
-                <a:r>
-                  <a:rPr lang="en-US" sz="2200" baseline="30000" dirty="0">
-                    <a:latin typeface="Century Gothic" panose="020B0502020202020204" pitchFamily="34" charset="0"/>
-                  </a:rPr>
-                  <a:t>S</a:t>
                 </a:r>
                 <a:r>
                   <a:rPr lang="en-US" sz="2200" baseline="-25000" dirty="0">
@@ -5266,12 +5242,6 @@
                   <a:t>y</a:t>
                 </a:r>
                 <a:r>
-                  <a:rPr lang="en-US" sz="2200" baseline="30000" dirty="0">
-                    <a:latin typeface="Century Gothic" panose="020B0502020202020204" pitchFamily="34" charset="0"/>
-                  </a:rPr>
-                  <a:t>S</a:t>
-                </a:r>
-                <a:r>
                   <a:rPr lang="en-US" sz="2200" baseline="-25000" dirty="0">
                     <a:latin typeface="Century Gothic" panose="020B0502020202020204" pitchFamily="34" charset="0"/>
                   </a:rPr>
@@ -5288,12 +5258,6 @@
                     <a:latin typeface="Century Gothic" panose="020B0502020202020204" pitchFamily="34" charset="0"/>
                   </a:rPr>
                   <a:t>y</a:t>
-                </a:r>
-                <a:r>
-                  <a:rPr lang="en-US" sz="2200" baseline="30000" dirty="0" err="1">
-                    <a:latin typeface="Century Gothic" panose="020B0502020202020204" pitchFamily="34" charset="0"/>
-                  </a:rPr>
-                  <a:t>S</a:t>
                 </a:r>
                 <a:r>
                   <a:rPr lang="en-US" sz="2200" i="1" baseline="-25000" dirty="0" err="1">
@@ -5732,12 +5696,6 @@
                   <a:latin typeface="Century Gothic" panose="020B0502020202020204" pitchFamily="34" charset="0"/>
                 </a:rPr>
                 <a:t>y</a:t>
-              </a:r>
-              <a:r>
-                <a:rPr lang="en-US" sz="2200" baseline="30000" dirty="0" err="1">
-                  <a:latin typeface="Century Gothic" panose="020B0502020202020204" pitchFamily="34" charset="0"/>
-                </a:rPr>
-                <a:t>S</a:t>
               </a:r>
               <a:r>
                 <a:rPr lang="en-US" sz="2200" i="1" baseline="-25000" dirty="0" err="1">

</xml_diff>